<commit_message>
write chapter 3:browse repository
</commit_message>
<xml_diff>
--- a/pptx/chapter-3.pptx
+++ b/pptx/chapter-3.pptx
@@ -7,7 +7,9 @@
   <p:sldIdLst>
     <p:sldId id="261" r:id="rId2"/>
     <p:sldId id="262" r:id="rId3"/>
-    <p:sldId id="263" r:id="rId4"/>
+    <p:sldId id="264" r:id="rId4"/>
+    <p:sldId id="263" r:id="rId5"/>
+    <p:sldId id="265" r:id="rId6"/>
   </p:sldIdLst>
   <p:sldSz cx="9144000" cy="6858000" type="screen4x3"/>
   <p:notesSz cx="6858000" cy="9144000"/>
@@ -3385,6 +3387,60 @@
         </p:blipFill>
         <p:spPr>
           <a:xfrm>
+            <a:off x="2738437" y="2433637"/>
+            <a:ext cx="3667125" cy="1990725"/>
+          </a:xfrm>
+          <a:prstGeom prst="rect">
+            <a:avLst/>
+          </a:prstGeom>
+        </p:spPr>
+      </p:pic>
+    </p:spTree>
+    <p:extLst>
+      <p:ext uri="{BB962C8B-B14F-4D97-AF65-F5344CB8AC3E}">
+        <p14:creationId xmlns:p14="http://schemas.microsoft.com/office/powerpoint/2010/main" val="2941747053"/>
+      </p:ext>
+    </p:extLst>
+  </p:cSld>
+  <p:clrMapOvr>
+    <a:masterClrMapping/>
+  </p:clrMapOvr>
+</p:sld>
+</file>
+
+<file path=ppt/slides/slide4.xml><?xml version="1.0" encoding="utf-8"?>
+<p:sld xmlns:a="http://schemas.openxmlformats.org/drawingml/2006/main" xmlns:r="http://schemas.openxmlformats.org/officeDocument/2006/relationships" xmlns:p="http://schemas.openxmlformats.org/presentationml/2006/main">
+  <p:cSld>
+    <p:spTree>
+      <p:nvGrpSpPr>
+        <p:cNvPr id="1" name=""/>
+        <p:cNvGrpSpPr/>
+        <p:nvPr/>
+      </p:nvGrpSpPr>
+      <p:grpSpPr>
+        <a:xfrm>
+          <a:off x="0" y="0"/>
+          <a:ext cx="0" cy="0"/>
+          <a:chOff x="0" y="0"/>
+          <a:chExt cx="0" cy="0"/>
+        </a:xfrm>
+      </p:grpSpPr>
+      <p:pic>
+        <p:nvPicPr>
+          <p:cNvPr id="2" name="図 1"/>
+          <p:cNvPicPr>
+            <a:picLocks noChangeAspect="1"/>
+          </p:cNvPicPr>
+          <p:nvPr/>
+        </p:nvPicPr>
+        <p:blipFill>
+          <a:blip r:embed="rId2"/>
+          <a:stretch>
+            <a:fillRect/>
+          </a:stretch>
+        </p:blipFill>
+        <p:spPr>
+          <a:xfrm>
             <a:off x="1152525" y="1042987"/>
             <a:ext cx="6838950" cy="4772025"/>
           </a:xfrm>
@@ -3397,6 +3453,60 @@
     <p:extLst>
       <p:ext uri="{BB962C8B-B14F-4D97-AF65-F5344CB8AC3E}">
         <p14:creationId xmlns:p14="http://schemas.microsoft.com/office/powerpoint/2010/main" val="758930984"/>
+      </p:ext>
+    </p:extLst>
+  </p:cSld>
+  <p:clrMapOvr>
+    <a:masterClrMapping/>
+  </p:clrMapOvr>
+</p:sld>
+</file>
+
+<file path=ppt/slides/slide5.xml><?xml version="1.0" encoding="utf-8"?>
+<p:sld xmlns:a="http://schemas.openxmlformats.org/drawingml/2006/main" xmlns:r="http://schemas.openxmlformats.org/officeDocument/2006/relationships" xmlns:p="http://schemas.openxmlformats.org/presentationml/2006/main">
+  <p:cSld>
+    <p:spTree>
+      <p:nvGrpSpPr>
+        <p:cNvPr id="1" name=""/>
+        <p:cNvGrpSpPr/>
+        <p:nvPr/>
+      </p:nvGrpSpPr>
+      <p:grpSpPr>
+        <a:xfrm>
+          <a:off x="0" y="0"/>
+          <a:ext cx="0" cy="0"/>
+          <a:chOff x="0" y="0"/>
+          <a:chExt cx="0" cy="0"/>
+        </a:xfrm>
+      </p:grpSpPr>
+      <p:pic>
+        <p:nvPicPr>
+          <p:cNvPr id="2" name="図 1"/>
+          <p:cNvPicPr>
+            <a:picLocks noChangeAspect="1"/>
+          </p:cNvPicPr>
+          <p:nvPr/>
+        </p:nvPicPr>
+        <p:blipFill>
+          <a:blip r:embed="rId2"/>
+          <a:stretch>
+            <a:fillRect/>
+          </a:stretch>
+        </p:blipFill>
+        <p:spPr>
+          <a:xfrm>
+            <a:off x="1186286" y="2033762"/>
+            <a:ext cx="6771428" cy="2790476"/>
+          </a:xfrm>
+          <a:prstGeom prst="rect">
+            <a:avLst/>
+          </a:prstGeom>
+        </p:spPr>
+      </p:pic>
+    </p:spTree>
+    <p:extLst>
+      <p:ext uri="{BB962C8B-B14F-4D97-AF65-F5344CB8AC3E}">
+        <p14:creationId xmlns:p14="http://schemas.microsoft.com/office/powerpoint/2010/main" val="334697385"/>
       </p:ext>
     </p:extLst>
   </p:cSld>

</xml_diff>

<commit_message>
write chapter 3:import file to repository and browse log
</commit_message>
<xml_diff>
--- a/pptx/chapter-3.pptx
+++ b/pptx/chapter-3.pptx
@@ -10,6 +10,12 @@
     <p:sldId id="264" r:id="rId4"/>
     <p:sldId id="263" r:id="rId5"/>
     <p:sldId id="265" r:id="rId6"/>
+    <p:sldId id="267" r:id="rId7"/>
+    <p:sldId id="266" r:id="rId8"/>
+    <p:sldId id="268" r:id="rId9"/>
+    <p:sldId id="269" r:id="rId10"/>
+    <p:sldId id="270" r:id="rId11"/>
+    <p:sldId id="271" r:id="rId12"/>
   </p:sldIdLst>
   <p:sldSz cx="9144000" cy="6858000" type="screen4x3"/>
   <p:notesSz cx="6858000" cy="9144000"/>
@@ -247,7 +253,7 @@
           <a:p>
             <a:fld id="{07DD73A8-177D-4FF7-AF69-632B85FAD23A}" type="datetimeFigureOut">
               <a:rPr kumimoji="1" lang="ja-JP" altLang="en-US" smtClean="0"/>
-              <a:t>2013/5/13</a:t>
+              <a:t>2013/5/16</a:t>
             </a:fld>
             <a:endParaRPr kumimoji="1" lang="ja-JP" altLang="en-US"/>
           </a:p>
@@ -449,7 +455,7 @@
           <a:p>
             <a:fld id="{07DD73A8-177D-4FF7-AF69-632B85FAD23A}" type="datetimeFigureOut">
               <a:rPr kumimoji="1" lang="ja-JP" altLang="en-US" smtClean="0"/>
-              <a:t>2013/5/13</a:t>
+              <a:t>2013/5/16</a:t>
             </a:fld>
             <a:endParaRPr kumimoji="1" lang="ja-JP" altLang="en-US"/>
           </a:p>
@@ -661,7 +667,7 @@
           <a:p>
             <a:fld id="{07DD73A8-177D-4FF7-AF69-632B85FAD23A}" type="datetimeFigureOut">
               <a:rPr kumimoji="1" lang="ja-JP" altLang="en-US" smtClean="0"/>
-              <a:t>2013/5/13</a:t>
+              <a:t>2013/5/16</a:t>
             </a:fld>
             <a:endParaRPr kumimoji="1" lang="ja-JP" altLang="en-US"/>
           </a:p>
@@ -863,7 +869,7 @@
           <a:p>
             <a:fld id="{07DD73A8-177D-4FF7-AF69-632B85FAD23A}" type="datetimeFigureOut">
               <a:rPr kumimoji="1" lang="ja-JP" altLang="en-US" smtClean="0"/>
-              <a:t>2013/5/13</a:t>
+              <a:t>2013/5/16</a:t>
             </a:fld>
             <a:endParaRPr kumimoji="1" lang="ja-JP" altLang="en-US"/>
           </a:p>
@@ -1107,7 +1113,7 @@
           <a:p>
             <a:fld id="{07DD73A8-177D-4FF7-AF69-632B85FAD23A}" type="datetimeFigureOut">
               <a:rPr kumimoji="1" lang="ja-JP" altLang="en-US" smtClean="0"/>
-              <a:t>2013/5/13</a:t>
+              <a:t>2013/5/16</a:t>
             </a:fld>
             <a:endParaRPr kumimoji="1" lang="ja-JP" altLang="en-US"/>
           </a:p>
@@ -1403,7 +1409,7 @@
           <a:p>
             <a:fld id="{07DD73A8-177D-4FF7-AF69-632B85FAD23A}" type="datetimeFigureOut">
               <a:rPr kumimoji="1" lang="ja-JP" altLang="en-US" smtClean="0"/>
-              <a:t>2013/5/13</a:t>
+              <a:t>2013/5/16</a:t>
             </a:fld>
             <a:endParaRPr kumimoji="1" lang="ja-JP" altLang="en-US"/>
           </a:p>
@@ -1834,7 +1840,7 @@
           <a:p>
             <a:fld id="{07DD73A8-177D-4FF7-AF69-632B85FAD23A}" type="datetimeFigureOut">
               <a:rPr kumimoji="1" lang="ja-JP" altLang="en-US" smtClean="0"/>
-              <a:t>2013/5/13</a:t>
+              <a:t>2013/5/16</a:t>
             </a:fld>
             <a:endParaRPr kumimoji="1" lang="ja-JP" altLang="en-US"/>
           </a:p>
@@ -1952,7 +1958,7 @@
           <a:p>
             <a:fld id="{07DD73A8-177D-4FF7-AF69-632B85FAD23A}" type="datetimeFigureOut">
               <a:rPr kumimoji="1" lang="ja-JP" altLang="en-US" smtClean="0"/>
-              <a:t>2013/5/13</a:t>
+              <a:t>2013/5/16</a:t>
             </a:fld>
             <a:endParaRPr kumimoji="1" lang="ja-JP" altLang="en-US"/>
           </a:p>
@@ -2047,7 +2053,7 @@
           <a:p>
             <a:fld id="{07DD73A8-177D-4FF7-AF69-632B85FAD23A}" type="datetimeFigureOut">
               <a:rPr kumimoji="1" lang="ja-JP" altLang="en-US" smtClean="0"/>
-              <a:t>2013/5/13</a:t>
+              <a:t>2013/5/16</a:t>
             </a:fld>
             <a:endParaRPr kumimoji="1" lang="ja-JP" altLang="en-US"/>
           </a:p>
@@ -2356,7 +2362,7 @@
           <a:p>
             <a:fld id="{07DD73A8-177D-4FF7-AF69-632B85FAD23A}" type="datetimeFigureOut">
               <a:rPr kumimoji="1" lang="ja-JP" altLang="en-US" smtClean="0"/>
-              <a:t>2013/5/13</a:t>
+              <a:t>2013/5/16</a:t>
             </a:fld>
             <a:endParaRPr kumimoji="1" lang="ja-JP" altLang="en-US"/>
           </a:p>
@@ -2613,7 +2619,7 @@
           <a:p>
             <a:fld id="{07DD73A8-177D-4FF7-AF69-632B85FAD23A}" type="datetimeFigureOut">
               <a:rPr kumimoji="1" lang="ja-JP" altLang="en-US" smtClean="0"/>
-              <a:t>2013/5/13</a:t>
+              <a:t>2013/5/16</a:t>
             </a:fld>
             <a:endParaRPr kumimoji="1" lang="ja-JP" altLang="en-US"/>
           </a:p>
@@ -2858,7 +2864,7 @@
           <a:p>
             <a:fld id="{07DD73A8-177D-4FF7-AF69-632B85FAD23A}" type="datetimeFigureOut">
               <a:rPr kumimoji="1" lang="ja-JP" altLang="en-US" smtClean="0"/>
-              <a:t>2013/5/13</a:t>
+              <a:t>2013/5/16</a:t>
             </a:fld>
             <a:endParaRPr kumimoji="1" lang="ja-JP" altLang="en-US"/>
           </a:p>
@@ -3300,6 +3306,114 @@
 </p:sld>
 </file>
 
+<file path=ppt/slides/slide10.xml><?xml version="1.0" encoding="utf-8"?>
+<p:sld xmlns:a="http://schemas.openxmlformats.org/drawingml/2006/main" xmlns:r="http://schemas.openxmlformats.org/officeDocument/2006/relationships" xmlns:p="http://schemas.openxmlformats.org/presentationml/2006/main">
+  <p:cSld>
+    <p:spTree>
+      <p:nvGrpSpPr>
+        <p:cNvPr id="1" name=""/>
+        <p:cNvGrpSpPr/>
+        <p:nvPr/>
+      </p:nvGrpSpPr>
+      <p:grpSpPr>
+        <a:xfrm>
+          <a:off x="0" y="0"/>
+          <a:ext cx="0" cy="0"/>
+          <a:chOff x="0" y="0"/>
+          <a:chExt cx="0" cy="0"/>
+        </a:xfrm>
+      </p:grpSpPr>
+      <p:pic>
+        <p:nvPicPr>
+          <p:cNvPr id="2" name="図 1"/>
+          <p:cNvPicPr>
+            <a:picLocks noChangeAspect="1"/>
+          </p:cNvPicPr>
+          <p:nvPr/>
+        </p:nvPicPr>
+        <p:blipFill>
+          <a:blip r:embed="rId2"/>
+          <a:stretch>
+            <a:fillRect/>
+          </a:stretch>
+        </p:blipFill>
+        <p:spPr>
+          <a:xfrm>
+            <a:off x="1510095" y="1086143"/>
+            <a:ext cx="6123809" cy="4685714"/>
+          </a:xfrm>
+          <a:prstGeom prst="rect">
+            <a:avLst/>
+          </a:prstGeom>
+        </p:spPr>
+      </p:pic>
+    </p:spTree>
+    <p:extLst>
+      <p:ext uri="{BB962C8B-B14F-4D97-AF65-F5344CB8AC3E}">
+        <p14:creationId xmlns:p14="http://schemas.microsoft.com/office/powerpoint/2010/main" val="1919570550"/>
+      </p:ext>
+    </p:extLst>
+  </p:cSld>
+  <p:clrMapOvr>
+    <a:masterClrMapping/>
+  </p:clrMapOvr>
+</p:sld>
+</file>
+
+<file path=ppt/slides/slide11.xml><?xml version="1.0" encoding="utf-8"?>
+<p:sld xmlns:a="http://schemas.openxmlformats.org/drawingml/2006/main" xmlns:r="http://schemas.openxmlformats.org/officeDocument/2006/relationships" xmlns:p="http://schemas.openxmlformats.org/presentationml/2006/main">
+  <p:cSld>
+    <p:spTree>
+      <p:nvGrpSpPr>
+        <p:cNvPr id="1" name=""/>
+        <p:cNvGrpSpPr/>
+        <p:nvPr/>
+      </p:nvGrpSpPr>
+      <p:grpSpPr>
+        <a:xfrm>
+          <a:off x="0" y="0"/>
+          <a:ext cx="0" cy="0"/>
+          <a:chOff x="0" y="0"/>
+          <a:chExt cx="0" cy="0"/>
+        </a:xfrm>
+      </p:grpSpPr>
+      <p:pic>
+        <p:nvPicPr>
+          <p:cNvPr id="2" name="図 1"/>
+          <p:cNvPicPr>
+            <a:picLocks noChangeAspect="1"/>
+          </p:cNvPicPr>
+          <p:nvPr/>
+        </p:nvPicPr>
+        <p:blipFill>
+          <a:blip r:embed="rId2"/>
+          <a:stretch>
+            <a:fillRect/>
+          </a:stretch>
+        </p:blipFill>
+        <p:spPr>
+          <a:xfrm>
+            <a:off x="1562100" y="1285875"/>
+            <a:ext cx="6019800" cy="4286250"/>
+          </a:xfrm>
+          <a:prstGeom prst="rect">
+            <a:avLst/>
+          </a:prstGeom>
+        </p:spPr>
+      </p:pic>
+    </p:spTree>
+    <p:extLst>
+      <p:ext uri="{BB962C8B-B14F-4D97-AF65-F5344CB8AC3E}">
+        <p14:creationId xmlns:p14="http://schemas.microsoft.com/office/powerpoint/2010/main" val="688552610"/>
+      </p:ext>
+    </p:extLst>
+  </p:cSld>
+  <p:clrMapOvr>
+    <a:masterClrMapping/>
+  </p:clrMapOvr>
+</p:sld>
+</file>
+
 <file path=ppt/slides/slide2.xml><?xml version="1.0" encoding="utf-8"?>
 <p:sld xmlns:a="http://schemas.openxmlformats.org/drawingml/2006/main" xmlns:r="http://schemas.openxmlformats.org/officeDocument/2006/relationships" xmlns:p="http://schemas.openxmlformats.org/presentationml/2006/main">
   <p:cSld>
@@ -3507,6 +3621,228 @@
     <p:extLst>
       <p:ext uri="{BB962C8B-B14F-4D97-AF65-F5344CB8AC3E}">
         <p14:creationId xmlns:p14="http://schemas.microsoft.com/office/powerpoint/2010/main" val="334697385"/>
+      </p:ext>
+    </p:extLst>
+  </p:cSld>
+  <p:clrMapOvr>
+    <a:masterClrMapping/>
+  </p:clrMapOvr>
+</p:sld>
+</file>
+
+<file path=ppt/slides/slide6.xml><?xml version="1.0" encoding="utf-8"?>
+<p:sld xmlns:a="http://schemas.openxmlformats.org/drawingml/2006/main" xmlns:r="http://schemas.openxmlformats.org/officeDocument/2006/relationships" xmlns:p="http://schemas.openxmlformats.org/presentationml/2006/main">
+  <p:cSld>
+    <p:spTree>
+      <p:nvGrpSpPr>
+        <p:cNvPr id="1" name=""/>
+        <p:cNvGrpSpPr/>
+        <p:nvPr/>
+      </p:nvGrpSpPr>
+      <p:grpSpPr>
+        <a:xfrm>
+          <a:off x="0" y="0"/>
+          <a:ext cx="0" cy="0"/>
+          <a:chOff x="0" y="0"/>
+          <a:chExt cx="0" cy="0"/>
+        </a:xfrm>
+      </p:grpSpPr>
+      <p:pic>
+        <p:nvPicPr>
+          <p:cNvPr id="3" name="図 2"/>
+          <p:cNvPicPr>
+            <a:picLocks noChangeAspect="1"/>
+          </p:cNvPicPr>
+          <p:nvPr/>
+        </p:nvPicPr>
+        <p:blipFill>
+          <a:blip r:embed="rId2">
+            <a:extLst>
+              <a:ext uri="{28A0092B-C50C-407E-A947-70E740481C1C}">
+                <a14:useLocalDpi xmlns:a14="http://schemas.microsoft.com/office/drawing/2010/main" val="0"/>
+              </a:ext>
+            </a:extLst>
+          </a:blip>
+          <a:stretch>
+            <a:fillRect/>
+          </a:stretch>
+        </p:blipFill>
+        <p:spPr>
+          <a:xfrm>
+            <a:off x="1528762" y="1085850"/>
+            <a:ext cx="6086475" cy="4686300"/>
+          </a:xfrm>
+          <a:prstGeom prst="rect">
+            <a:avLst/>
+          </a:prstGeom>
+        </p:spPr>
+      </p:pic>
+    </p:spTree>
+    <p:extLst>
+      <p:ext uri="{BB962C8B-B14F-4D97-AF65-F5344CB8AC3E}">
+        <p14:creationId xmlns:p14="http://schemas.microsoft.com/office/powerpoint/2010/main" val="815013072"/>
+      </p:ext>
+    </p:extLst>
+  </p:cSld>
+  <p:clrMapOvr>
+    <a:masterClrMapping/>
+  </p:clrMapOvr>
+</p:sld>
+</file>
+
+<file path=ppt/slides/slide7.xml><?xml version="1.0" encoding="utf-8"?>
+<p:sld xmlns:a="http://schemas.openxmlformats.org/drawingml/2006/main" xmlns:r="http://schemas.openxmlformats.org/officeDocument/2006/relationships" xmlns:p="http://schemas.openxmlformats.org/presentationml/2006/main">
+  <p:cSld>
+    <p:spTree>
+      <p:nvGrpSpPr>
+        <p:cNvPr id="1" name=""/>
+        <p:cNvGrpSpPr/>
+        <p:nvPr/>
+      </p:nvGrpSpPr>
+      <p:grpSpPr>
+        <a:xfrm>
+          <a:off x="0" y="0"/>
+          <a:ext cx="0" cy="0"/>
+          <a:chOff x="0" y="0"/>
+          <a:chExt cx="0" cy="0"/>
+        </a:xfrm>
+      </p:grpSpPr>
+      <p:pic>
+        <p:nvPicPr>
+          <p:cNvPr id="2" name="図 1"/>
+          <p:cNvPicPr>
+            <a:picLocks noChangeAspect="1"/>
+          </p:cNvPicPr>
+          <p:nvPr/>
+        </p:nvPicPr>
+        <p:blipFill>
+          <a:blip r:embed="rId2"/>
+          <a:stretch>
+            <a:fillRect/>
+          </a:stretch>
+        </p:blipFill>
+        <p:spPr>
+          <a:xfrm>
+            <a:off x="1086286" y="638524"/>
+            <a:ext cx="6971428" cy="5580952"/>
+          </a:xfrm>
+          <a:prstGeom prst="rect">
+            <a:avLst/>
+          </a:prstGeom>
+        </p:spPr>
+      </p:pic>
+    </p:spTree>
+    <p:extLst>
+      <p:ext uri="{BB962C8B-B14F-4D97-AF65-F5344CB8AC3E}">
+        <p14:creationId xmlns:p14="http://schemas.microsoft.com/office/powerpoint/2010/main" val="3896101683"/>
+      </p:ext>
+    </p:extLst>
+  </p:cSld>
+  <p:clrMapOvr>
+    <a:masterClrMapping/>
+  </p:clrMapOvr>
+</p:sld>
+</file>
+
+<file path=ppt/slides/slide8.xml><?xml version="1.0" encoding="utf-8"?>
+<p:sld xmlns:a="http://schemas.openxmlformats.org/drawingml/2006/main" xmlns:r="http://schemas.openxmlformats.org/officeDocument/2006/relationships" xmlns:p="http://schemas.openxmlformats.org/presentationml/2006/main">
+  <p:cSld>
+    <p:spTree>
+      <p:nvGrpSpPr>
+        <p:cNvPr id="1" name=""/>
+        <p:cNvGrpSpPr/>
+        <p:nvPr/>
+      </p:nvGrpSpPr>
+      <p:grpSpPr>
+        <a:xfrm>
+          <a:off x="0" y="0"/>
+          <a:ext cx="0" cy="0"/>
+          <a:chOff x="0" y="0"/>
+          <a:chExt cx="0" cy="0"/>
+        </a:xfrm>
+      </p:grpSpPr>
+      <p:pic>
+        <p:nvPicPr>
+          <p:cNvPr id="2" name="図 1"/>
+          <p:cNvPicPr>
+            <a:picLocks noChangeAspect="1"/>
+          </p:cNvPicPr>
+          <p:nvPr/>
+        </p:nvPicPr>
+        <p:blipFill>
+          <a:blip r:embed="rId2"/>
+          <a:stretch>
+            <a:fillRect/>
+          </a:stretch>
+        </p:blipFill>
+        <p:spPr>
+          <a:xfrm>
+            <a:off x="1595437" y="1838325"/>
+            <a:ext cx="5953125" cy="3181350"/>
+          </a:xfrm>
+          <a:prstGeom prst="rect">
+            <a:avLst/>
+          </a:prstGeom>
+        </p:spPr>
+      </p:pic>
+    </p:spTree>
+    <p:extLst>
+      <p:ext uri="{BB962C8B-B14F-4D97-AF65-F5344CB8AC3E}">
+        <p14:creationId xmlns:p14="http://schemas.microsoft.com/office/powerpoint/2010/main" val="1822815019"/>
+      </p:ext>
+    </p:extLst>
+  </p:cSld>
+  <p:clrMapOvr>
+    <a:masterClrMapping/>
+  </p:clrMapOvr>
+</p:sld>
+</file>
+
+<file path=ppt/slides/slide9.xml><?xml version="1.0" encoding="utf-8"?>
+<p:sld xmlns:a="http://schemas.openxmlformats.org/drawingml/2006/main" xmlns:r="http://schemas.openxmlformats.org/officeDocument/2006/relationships" xmlns:p="http://schemas.openxmlformats.org/presentationml/2006/main">
+  <p:cSld>
+    <p:spTree>
+      <p:nvGrpSpPr>
+        <p:cNvPr id="1" name=""/>
+        <p:cNvGrpSpPr/>
+        <p:nvPr/>
+      </p:nvGrpSpPr>
+      <p:grpSpPr>
+        <a:xfrm>
+          <a:off x="0" y="0"/>
+          <a:ext cx="0" cy="0"/>
+          <a:chOff x="0" y="0"/>
+          <a:chExt cx="0" cy="0"/>
+        </a:xfrm>
+      </p:grpSpPr>
+      <p:pic>
+        <p:nvPicPr>
+          <p:cNvPr id="2" name="図 1"/>
+          <p:cNvPicPr>
+            <a:picLocks noChangeAspect="1"/>
+          </p:cNvPicPr>
+          <p:nvPr/>
+        </p:nvPicPr>
+        <p:blipFill>
+          <a:blip r:embed="rId2"/>
+          <a:stretch>
+            <a:fillRect/>
+          </a:stretch>
+        </p:blipFill>
+        <p:spPr>
+          <a:xfrm>
+            <a:off x="1528762" y="1090612"/>
+            <a:ext cx="6086475" cy="4676775"/>
+          </a:xfrm>
+          <a:prstGeom prst="rect">
+            <a:avLst/>
+          </a:prstGeom>
+        </p:spPr>
+      </p:pic>
+    </p:spTree>
+    <p:extLst>
+      <p:ext uri="{BB962C8B-B14F-4D97-AF65-F5344CB8AC3E}">
+        <p14:creationId xmlns:p14="http://schemas.microsoft.com/office/powerpoint/2010/main" val="2852556780"/>
       </p:ext>
     </p:extLst>
   </p:cSld>

</xml_diff>